<commit_message>
After review from Kai some changes have been made to Velociraptor and other training systems
</commit_message>
<xml_diff>
--- a/host/velociraptor/Velociraptor.pptx
+++ b/host/velociraptor/Velociraptor.pptx
@@ -115,6 +115,11 @@
       </a:defRPr>
     </a:lvl9pPr>
   </p:defaultTextStyle>
+  <p:extLst>
+    <p:ext uri="{EFAFB233-063F-42B5-8137-9DF3F51BA10A}">
+      <p15:sldGuideLst xmlns:p15="http://schemas.microsoft.com/office/powerpoint/2012/main"/>
+    </p:ext>
+  </p:extLst>
 </p:presentation>
 </file>
 
@@ -267,7 +272,7 @@
           <a:p>
             <a:fld id="{E7B8E0CB-18B2-4FF0-B730-DD57310780AA}" type="datetimeFigureOut">
               <a:rPr lang="en-AU" smtClean="0"/>
-              <a:t>3/12/2025</a:t>
+              <a:t>12/01/2026</a:t>
             </a:fld>
             <a:endParaRPr lang="en-AU"/>
           </a:p>
@@ -467,7 +472,7 @@
           <a:p>
             <a:fld id="{E7B8E0CB-18B2-4FF0-B730-DD57310780AA}" type="datetimeFigureOut">
               <a:rPr lang="en-AU" smtClean="0"/>
-              <a:t>3/12/2025</a:t>
+              <a:t>12/01/2026</a:t>
             </a:fld>
             <a:endParaRPr lang="en-AU"/>
           </a:p>
@@ -677,7 +682,7 @@
           <a:p>
             <a:fld id="{E7B8E0CB-18B2-4FF0-B730-DD57310780AA}" type="datetimeFigureOut">
               <a:rPr lang="en-AU" smtClean="0"/>
-              <a:t>3/12/2025</a:t>
+              <a:t>12/01/2026</a:t>
             </a:fld>
             <a:endParaRPr lang="en-AU"/>
           </a:p>
@@ -877,7 +882,7 @@
           <a:p>
             <a:fld id="{E7B8E0CB-18B2-4FF0-B730-DD57310780AA}" type="datetimeFigureOut">
               <a:rPr lang="en-AU" smtClean="0"/>
-              <a:t>3/12/2025</a:t>
+              <a:t>12/01/2026</a:t>
             </a:fld>
             <a:endParaRPr lang="en-AU"/>
           </a:p>
@@ -1153,7 +1158,7 @@
           <a:p>
             <a:fld id="{E7B8E0CB-18B2-4FF0-B730-DD57310780AA}" type="datetimeFigureOut">
               <a:rPr lang="en-AU" smtClean="0"/>
-              <a:t>3/12/2025</a:t>
+              <a:t>12/01/2026</a:t>
             </a:fld>
             <a:endParaRPr lang="en-AU"/>
           </a:p>
@@ -1421,7 +1426,7 @@
           <a:p>
             <a:fld id="{E7B8E0CB-18B2-4FF0-B730-DD57310780AA}" type="datetimeFigureOut">
               <a:rPr lang="en-AU" smtClean="0"/>
-              <a:t>3/12/2025</a:t>
+              <a:t>12/01/2026</a:t>
             </a:fld>
             <a:endParaRPr lang="en-AU"/>
           </a:p>
@@ -1836,7 +1841,7 @@
           <a:p>
             <a:fld id="{E7B8E0CB-18B2-4FF0-B730-DD57310780AA}" type="datetimeFigureOut">
               <a:rPr lang="en-AU" smtClean="0"/>
-              <a:t>3/12/2025</a:t>
+              <a:t>12/01/2026</a:t>
             </a:fld>
             <a:endParaRPr lang="en-AU"/>
           </a:p>
@@ -1978,7 +1983,7 @@
           <a:p>
             <a:fld id="{E7B8E0CB-18B2-4FF0-B730-DD57310780AA}" type="datetimeFigureOut">
               <a:rPr lang="en-AU" smtClean="0"/>
-              <a:t>3/12/2025</a:t>
+              <a:t>12/01/2026</a:t>
             </a:fld>
             <a:endParaRPr lang="en-AU"/>
           </a:p>
@@ -2091,7 +2096,7 @@
           <a:p>
             <a:fld id="{E7B8E0CB-18B2-4FF0-B730-DD57310780AA}" type="datetimeFigureOut">
               <a:rPr lang="en-AU" smtClean="0"/>
-              <a:t>3/12/2025</a:t>
+              <a:t>12/01/2026</a:t>
             </a:fld>
             <a:endParaRPr lang="en-AU"/>
           </a:p>
@@ -2404,7 +2409,7 @@
           <a:p>
             <a:fld id="{E7B8E0CB-18B2-4FF0-B730-DD57310780AA}" type="datetimeFigureOut">
               <a:rPr lang="en-AU" smtClean="0"/>
-              <a:t>3/12/2025</a:t>
+              <a:t>12/01/2026</a:t>
             </a:fld>
             <a:endParaRPr lang="en-AU"/>
           </a:p>
@@ -2693,7 +2698,7 @@
           <a:p>
             <a:fld id="{E7B8E0CB-18B2-4FF0-B730-DD57310780AA}" type="datetimeFigureOut">
               <a:rPr lang="en-AU" smtClean="0"/>
-              <a:t>3/12/2025</a:t>
+              <a:t>12/01/2026</a:t>
             </a:fld>
             <a:endParaRPr lang="en-AU"/>
           </a:p>
@@ -2936,7 +2941,7 @@
           <a:p>
             <a:fld id="{E7B8E0CB-18B2-4FF0-B730-DD57310780AA}" type="datetimeFigureOut">
               <a:rPr lang="en-AU" smtClean="0"/>
-              <a:t>3/12/2025</a:t>
+              <a:t>12/01/2026</a:t>
             </a:fld>
             <a:endParaRPr lang="en-AU"/>
           </a:p>

</xml_diff>

<commit_message>
Added more items to the powerpoints
</commit_message>
<xml_diff>
--- a/host/velociraptor/Velociraptor.pptx
+++ b/host/velociraptor/Velociraptor.pptx
@@ -4,18 +4,21 @@
   <p:sldMasterIdLst>
     <p:sldMasterId id="2147483648" r:id="rId1"/>
   </p:sldMasterIdLst>
+  <p:notesMasterIdLst>
+    <p:notesMasterId r:id="rId14"/>
+  </p:notesMasterIdLst>
   <p:sldIdLst>
     <p:sldId id="256" r:id="rId2"/>
     <p:sldId id="258" r:id="rId3"/>
     <p:sldId id="259" r:id="rId4"/>
     <p:sldId id="257" r:id="rId5"/>
     <p:sldId id="260" r:id="rId6"/>
-    <p:sldId id="261" r:id="rId7"/>
-    <p:sldId id="262" r:id="rId8"/>
-    <p:sldId id="263" r:id="rId9"/>
-    <p:sldId id="264" r:id="rId10"/>
-    <p:sldId id="265" r:id="rId11"/>
-    <p:sldId id="266" r:id="rId12"/>
+    <p:sldId id="263" r:id="rId7"/>
+    <p:sldId id="264" r:id="rId8"/>
+    <p:sldId id="265" r:id="rId9"/>
+    <p:sldId id="262" r:id="rId10"/>
+    <p:sldId id="266" r:id="rId11"/>
+    <p:sldId id="261" r:id="rId12"/>
     <p:sldId id="267" r:id="rId13"/>
   </p:sldIdLst>
   <p:sldSz cx="12192000" cy="6858000"/>
@@ -123,6 +126,446 @@
 </p:presentation>
 </file>
 
+<file path=ppt/notesMasters/notesMaster1.xml><?xml version="1.0" encoding="utf-8"?>
+<p:notesMaster xmlns:a="http://schemas.openxmlformats.org/drawingml/2006/main" xmlns:r="http://schemas.openxmlformats.org/officeDocument/2006/relationships" xmlns:p="http://schemas.openxmlformats.org/presentationml/2006/main">
+  <p:cSld>
+    <p:bg>
+      <p:bgRef idx="1001">
+        <a:schemeClr val="bg1"/>
+      </p:bgRef>
+    </p:bg>
+    <p:spTree>
+      <p:nvGrpSpPr>
+        <p:cNvPr id="1" name=""/>
+        <p:cNvGrpSpPr/>
+        <p:nvPr/>
+      </p:nvGrpSpPr>
+      <p:grpSpPr>
+        <a:xfrm>
+          <a:off x="0" y="0"/>
+          <a:ext cx="0" cy="0"/>
+          <a:chOff x="0" y="0"/>
+          <a:chExt cx="0" cy="0"/>
+        </a:xfrm>
+      </p:grpSpPr>
+      <p:sp>
+        <p:nvSpPr>
+          <p:cNvPr id="2" name="Header Placeholder 1"/>
+          <p:cNvSpPr>
+            <a:spLocks noGrp="1"/>
+          </p:cNvSpPr>
+          <p:nvPr>
+            <p:ph type="hdr" sz="quarter"/>
+          </p:nvPr>
+        </p:nvSpPr>
+        <p:spPr>
+          <a:xfrm>
+            <a:off x="0" y="0"/>
+            <a:ext cx="2971800" cy="458788"/>
+          </a:xfrm>
+          <a:prstGeom prst="rect">
+            <a:avLst/>
+          </a:prstGeom>
+        </p:spPr>
+        <p:txBody>
+          <a:bodyPr vert="horz" lIns="91440" tIns="45720" rIns="91440" bIns="45720" rtlCol="0"/>
+          <a:lstStyle>
+            <a:lvl1pPr algn="l">
+              <a:defRPr sz="1200"/>
+            </a:lvl1pPr>
+          </a:lstStyle>
+          <a:p>
+            <a:endParaRPr lang="en-AU"/>
+          </a:p>
+        </p:txBody>
+      </p:sp>
+      <p:sp>
+        <p:nvSpPr>
+          <p:cNvPr id="3" name="Date Placeholder 2"/>
+          <p:cNvSpPr>
+            <a:spLocks noGrp="1"/>
+          </p:cNvSpPr>
+          <p:nvPr>
+            <p:ph type="dt" idx="1"/>
+          </p:nvPr>
+        </p:nvSpPr>
+        <p:spPr>
+          <a:xfrm>
+            <a:off x="3884613" y="0"/>
+            <a:ext cx="2971800" cy="458788"/>
+          </a:xfrm>
+          <a:prstGeom prst="rect">
+            <a:avLst/>
+          </a:prstGeom>
+        </p:spPr>
+        <p:txBody>
+          <a:bodyPr vert="horz" lIns="91440" tIns="45720" rIns="91440" bIns="45720" rtlCol="0"/>
+          <a:lstStyle>
+            <a:lvl1pPr algn="r">
+              <a:defRPr sz="1200"/>
+            </a:lvl1pPr>
+          </a:lstStyle>
+          <a:p>
+            <a:fld id="{BC9355C1-AE33-40A3-9DD3-43C3CF7E8127}" type="datetimeFigureOut">
+              <a:rPr lang="en-AU" smtClean="0"/>
+              <a:t>14/01/2026</a:t>
+            </a:fld>
+            <a:endParaRPr lang="en-AU"/>
+          </a:p>
+        </p:txBody>
+      </p:sp>
+      <p:sp>
+        <p:nvSpPr>
+          <p:cNvPr id="4" name="Slide Image Placeholder 3"/>
+          <p:cNvSpPr>
+            <a:spLocks noGrp="1" noRot="1" noChangeAspect="1"/>
+          </p:cNvSpPr>
+          <p:nvPr>
+            <p:ph type="sldImg" idx="2"/>
+          </p:nvPr>
+        </p:nvSpPr>
+        <p:spPr>
+          <a:xfrm>
+            <a:off x="685800" y="1143000"/>
+            <a:ext cx="5486400" cy="3086100"/>
+          </a:xfrm>
+          <a:prstGeom prst="rect">
+            <a:avLst/>
+          </a:prstGeom>
+          <a:noFill/>
+          <a:ln w="12700">
+            <a:solidFill>
+              <a:prstClr val="black"/>
+            </a:solidFill>
+          </a:ln>
+        </p:spPr>
+        <p:txBody>
+          <a:bodyPr vert="horz" lIns="91440" tIns="45720" rIns="91440" bIns="45720" rtlCol="0" anchor="ctr"/>
+          <a:lstStyle/>
+          <a:p>
+            <a:endParaRPr lang="en-AU"/>
+          </a:p>
+        </p:txBody>
+      </p:sp>
+      <p:sp>
+        <p:nvSpPr>
+          <p:cNvPr id="5" name="Notes Placeholder 4"/>
+          <p:cNvSpPr>
+            <a:spLocks noGrp="1"/>
+          </p:cNvSpPr>
+          <p:nvPr>
+            <p:ph type="body" sz="quarter" idx="3"/>
+          </p:nvPr>
+        </p:nvSpPr>
+        <p:spPr>
+          <a:xfrm>
+            <a:off x="685800" y="4400550"/>
+            <a:ext cx="5486400" cy="3600450"/>
+          </a:xfrm>
+          <a:prstGeom prst="rect">
+            <a:avLst/>
+          </a:prstGeom>
+        </p:spPr>
+        <p:txBody>
+          <a:bodyPr vert="horz" lIns="91440" tIns="45720" rIns="91440" bIns="45720" rtlCol="0"/>
+          <a:lstStyle/>
+          <a:p>
+            <a:pPr lvl="0"/>
+            <a:r>
+              <a:rPr lang="en-US"/>
+              <a:t>Click to edit Master text styles</a:t>
+            </a:r>
+          </a:p>
+          <a:p>
+            <a:pPr lvl="1"/>
+            <a:r>
+              <a:rPr lang="en-US"/>
+              <a:t>Second level</a:t>
+            </a:r>
+          </a:p>
+          <a:p>
+            <a:pPr lvl="2"/>
+            <a:r>
+              <a:rPr lang="en-US"/>
+              <a:t>Third level</a:t>
+            </a:r>
+          </a:p>
+          <a:p>
+            <a:pPr lvl="3"/>
+            <a:r>
+              <a:rPr lang="en-US"/>
+              <a:t>Fourth level</a:t>
+            </a:r>
+          </a:p>
+          <a:p>
+            <a:pPr lvl="4"/>
+            <a:r>
+              <a:rPr lang="en-US"/>
+              <a:t>Fifth level</a:t>
+            </a:r>
+            <a:endParaRPr lang="en-AU"/>
+          </a:p>
+        </p:txBody>
+      </p:sp>
+      <p:sp>
+        <p:nvSpPr>
+          <p:cNvPr id="6" name="Footer Placeholder 5"/>
+          <p:cNvSpPr>
+            <a:spLocks noGrp="1"/>
+          </p:cNvSpPr>
+          <p:nvPr>
+            <p:ph type="ftr" sz="quarter" idx="4"/>
+          </p:nvPr>
+        </p:nvSpPr>
+        <p:spPr>
+          <a:xfrm>
+            <a:off x="0" y="8685213"/>
+            <a:ext cx="2971800" cy="458787"/>
+          </a:xfrm>
+          <a:prstGeom prst="rect">
+            <a:avLst/>
+          </a:prstGeom>
+        </p:spPr>
+        <p:txBody>
+          <a:bodyPr vert="horz" lIns="91440" tIns="45720" rIns="91440" bIns="45720" rtlCol="0" anchor="b"/>
+          <a:lstStyle>
+            <a:lvl1pPr algn="l">
+              <a:defRPr sz="1200"/>
+            </a:lvl1pPr>
+          </a:lstStyle>
+          <a:p>
+            <a:endParaRPr lang="en-AU"/>
+          </a:p>
+        </p:txBody>
+      </p:sp>
+      <p:sp>
+        <p:nvSpPr>
+          <p:cNvPr id="7" name="Slide Number Placeholder 6"/>
+          <p:cNvSpPr>
+            <a:spLocks noGrp="1"/>
+          </p:cNvSpPr>
+          <p:nvPr>
+            <p:ph type="sldNum" sz="quarter" idx="5"/>
+          </p:nvPr>
+        </p:nvSpPr>
+        <p:spPr>
+          <a:xfrm>
+            <a:off x="3884613" y="8685213"/>
+            <a:ext cx="2971800" cy="458787"/>
+          </a:xfrm>
+          <a:prstGeom prst="rect">
+            <a:avLst/>
+          </a:prstGeom>
+        </p:spPr>
+        <p:txBody>
+          <a:bodyPr vert="horz" lIns="91440" tIns="45720" rIns="91440" bIns="45720" rtlCol="0" anchor="b"/>
+          <a:lstStyle>
+            <a:lvl1pPr algn="r">
+              <a:defRPr sz="1200"/>
+            </a:lvl1pPr>
+          </a:lstStyle>
+          <a:p>
+            <a:fld id="{0B4B7631-9F44-42D7-9296-05F024CD030C}" type="slidenum">
+              <a:rPr lang="en-AU" smtClean="0"/>
+              <a:t>‹#›</a:t>
+            </a:fld>
+            <a:endParaRPr lang="en-AU"/>
+          </a:p>
+        </p:txBody>
+      </p:sp>
+    </p:spTree>
+    <p:extLst>
+      <p:ext uri="{BB962C8B-B14F-4D97-AF65-F5344CB8AC3E}">
+        <p14:creationId xmlns:p14="http://schemas.microsoft.com/office/powerpoint/2010/main" val="1215966004"/>
+      </p:ext>
+    </p:extLst>
+  </p:cSld>
+  <p:clrMap bg1="lt1" tx1="dk1" bg2="lt2" tx2="dk2" accent1="accent1" accent2="accent2" accent3="accent3" accent4="accent4" accent5="accent5" accent6="accent6" hlink="hlink" folHlink="folHlink"/>
+  <p:notesStyle>
+    <a:lvl1pPr marL="0" algn="l" defTabSz="914400" rtl="0" eaLnBrk="1" latinLnBrk="0" hangingPunct="1">
+      <a:defRPr sz="1200" kern="1200">
+        <a:solidFill>
+          <a:schemeClr val="tx1"/>
+        </a:solidFill>
+        <a:latin typeface="+mn-lt"/>
+        <a:ea typeface="+mn-ea"/>
+        <a:cs typeface="+mn-cs"/>
+      </a:defRPr>
+    </a:lvl1pPr>
+    <a:lvl2pPr marL="457200" algn="l" defTabSz="914400" rtl="0" eaLnBrk="1" latinLnBrk="0" hangingPunct="1">
+      <a:defRPr sz="1200" kern="1200">
+        <a:solidFill>
+          <a:schemeClr val="tx1"/>
+        </a:solidFill>
+        <a:latin typeface="+mn-lt"/>
+        <a:ea typeface="+mn-ea"/>
+        <a:cs typeface="+mn-cs"/>
+      </a:defRPr>
+    </a:lvl2pPr>
+    <a:lvl3pPr marL="914400" algn="l" defTabSz="914400" rtl="0" eaLnBrk="1" latinLnBrk="0" hangingPunct="1">
+      <a:defRPr sz="1200" kern="1200">
+        <a:solidFill>
+          <a:schemeClr val="tx1"/>
+        </a:solidFill>
+        <a:latin typeface="+mn-lt"/>
+        <a:ea typeface="+mn-ea"/>
+        <a:cs typeface="+mn-cs"/>
+      </a:defRPr>
+    </a:lvl3pPr>
+    <a:lvl4pPr marL="1371600" algn="l" defTabSz="914400" rtl="0" eaLnBrk="1" latinLnBrk="0" hangingPunct="1">
+      <a:defRPr sz="1200" kern="1200">
+        <a:solidFill>
+          <a:schemeClr val="tx1"/>
+        </a:solidFill>
+        <a:latin typeface="+mn-lt"/>
+        <a:ea typeface="+mn-ea"/>
+        <a:cs typeface="+mn-cs"/>
+      </a:defRPr>
+    </a:lvl4pPr>
+    <a:lvl5pPr marL="1828800" algn="l" defTabSz="914400" rtl="0" eaLnBrk="1" latinLnBrk="0" hangingPunct="1">
+      <a:defRPr sz="1200" kern="1200">
+        <a:solidFill>
+          <a:schemeClr val="tx1"/>
+        </a:solidFill>
+        <a:latin typeface="+mn-lt"/>
+        <a:ea typeface="+mn-ea"/>
+        <a:cs typeface="+mn-cs"/>
+      </a:defRPr>
+    </a:lvl5pPr>
+    <a:lvl6pPr marL="2286000" algn="l" defTabSz="914400" rtl="0" eaLnBrk="1" latinLnBrk="0" hangingPunct="1">
+      <a:defRPr sz="1200" kern="1200">
+        <a:solidFill>
+          <a:schemeClr val="tx1"/>
+        </a:solidFill>
+        <a:latin typeface="+mn-lt"/>
+        <a:ea typeface="+mn-ea"/>
+        <a:cs typeface="+mn-cs"/>
+      </a:defRPr>
+    </a:lvl6pPr>
+    <a:lvl7pPr marL="2743200" algn="l" defTabSz="914400" rtl="0" eaLnBrk="1" latinLnBrk="0" hangingPunct="1">
+      <a:defRPr sz="1200" kern="1200">
+        <a:solidFill>
+          <a:schemeClr val="tx1"/>
+        </a:solidFill>
+        <a:latin typeface="+mn-lt"/>
+        <a:ea typeface="+mn-ea"/>
+        <a:cs typeface="+mn-cs"/>
+      </a:defRPr>
+    </a:lvl7pPr>
+    <a:lvl8pPr marL="3200400" algn="l" defTabSz="914400" rtl="0" eaLnBrk="1" latinLnBrk="0" hangingPunct="1">
+      <a:defRPr sz="1200" kern="1200">
+        <a:solidFill>
+          <a:schemeClr val="tx1"/>
+        </a:solidFill>
+        <a:latin typeface="+mn-lt"/>
+        <a:ea typeface="+mn-ea"/>
+        <a:cs typeface="+mn-cs"/>
+      </a:defRPr>
+    </a:lvl8pPr>
+    <a:lvl9pPr marL="3657600" algn="l" defTabSz="914400" rtl="0" eaLnBrk="1" latinLnBrk="0" hangingPunct="1">
+      <a:defRPr sz="1200" kern="1200">
+        <a:solidFill>
+          <a:schemeClr val="tx1"/>
+        </a:solidFill>
+        <a:latin typeface="+mn-lt"/>
+        <a:ea typeface="+mn-ea"/>
+        <a:cs typeface="+mn-cs"/>
+      </a:defRPr>
+    </a:lvl9pPr>
+  </p:notesStyle>
+</p:notesMaster>
+</file>
+
+<file path=ppt/notesSlides/notesSlide1.xml><?xml version="1.0" encoding="utf-8"?>
+<p:notes xmlns:a="http://schemas.openxmlformats.org/drawingml/2006/main" xmlns:r="http://schemas.openxmlformats.org/officeDocument/2006/relationships" xmlns:p="http://schemas.openxmlformats.org/presentationml/2006/main">
+  <p:cSld>
+    <p:spTree>
+      <p:nvGrpSpPr>
+        <p:cNvPr id="1" name=""/>
+        <p:cNvGrpSpPr/>
+        <p:nvPr/>
+      </p:nvGrpSpPr>
+      <p:grpSpPr>
+        <a:xfrm>
+          <a:off x="0" y="0"/>
+          <a:ext cx="0" cy="0"/>
+          <a:chOff x="0" y="0"/>
+          <a:chExt cx="0" cy="0"/>
+        </a:xfrm>
+      </p:grpSpPr>
+      <p:sp>
+        <p:nvSpPr>
+          <p:cNvPr id="2" name="Slide Image Placeholder 1"/>
+          <p:cNvSpPr>
+            <a:spLocks noGrp="1" noRot="1" noChangeAspect="1"/>
+          </p:cNvSpPr>
+          <p:nvPr>
+            <p:ph type="sldImg"/>
+          </p:nvPr>
+        </p:nvSpPr>
+        <p:spPr/>
+      </p:sp>
+      <p:sp>
+        <p:nvSpPr>
+          <p:cNvPr id="3" name="Notes Placeholder 2"/>
+          <p:cNvSpPr>
+            <a:spLocks noGrp="1"/>
+          </p:cNvSpPr>
+          <p:nvPr>
+            <p:ph type="body" idx="1"/>
+          </p:nvPr>
+        </p:nvSpPr>
+        <p:spPr/>
+        <p:txBody>
+          <a:bodyPr/>
+          <a:lstStyle/>
+          <a:p>
+            <a:r>
+              <a:rPr lang="en-AU" dirty="0"/>
+              <a:t>Make a markdown on the theory</a:t>
+            </a:r>
+          </a:p>
+          <a:p>
+            <a:endParaRPr lang="en-AU" dirty="0"/>
+          </a:p>
+        </p:txBody>
+      </p:sp>
+      <p:sp>
+        <p:nvSpPr>
+          <p:cNvPr id="4" name="Slide Number Placeholder 3"/>
+          <p:cNvSpPr>
+            <a:spLocks noGrp="1"/>
+          </p:cNvSpPr>
+          <p:nvPr>
+            <p:ph type="sldNum" sz="quarter" idx="5"/>
+          </p:nvPr>
+        </p:nvSpPr>
+        <p:spPr/>
+        <p:txBody>
+          <a:bodyPr/>
+          <a:lstStyle/>
+          <a:p>
+            <a:fld id="{0B4B7631-9F44-42D7-9296-05F024CD030C}" type="slidenum">
+              <a:rPr lang="en-AU" smtClean="0"/>
+              <a:t>1</a:t>
+            </a:fld>
+            <a:endParaRPr lang="en-AU"/>
+          </a:p>
+        </p:txBody>
+      </p:sp>
+    </p:spTree>
+    <p:extLst>
+      <p:ext uri="{BB962C8B-B14F-4D97-AF65-F5344CB8AC3E}">
+        <p14:creationId xmlns:p14="http://schemas.microsoft.com/office/powerpoint/2010/main" val="1802969362"/>
+      </p:ext>
+    </p:extLst>
+  </p:cSld>
+  <p:clrMapOvr>
+    <a:masterClrMapping/>
+  </p:clrMapOvr>
+</p:notes>
+</file>
+
 <file path=ppt/slideLayouts/slideLayout1.xml><?xml version="1.0" encoding="utf-8"?>
 <p:sldLayout xmlns:a="http://schemas.openxmlformats.org/drawingml/2006/main" xmlns:r="http://schemas.openxmlformats.org/officeDocument/2006/relationships" xmlns:p="http://schemas.openxmlformats.org/presentationml/2006/main" type="title" preserve="1">
   <p:cSld name="Title Slide">
@@ -272,7 +715,7 @@
           <a:p>
             <a:fld id="{E7B8E0CB-18B2-4FF0-B730-DD57310780AA}" type="datetimeFigureOut">
               <a:rPr lang="en-AU" smtClean="0"/>
-              <a:t>12/01/2026</a:t>
+              <a:t>14/01/2026</a:t>
             </a:fld>
             <a:endParaRPr lang="en-AU"/>
           </a:p>
@@ -472,7 +915,7 @@
           <a:p>
             <a:fld id="{E7B8E0CB-18B2-4FF0-B730-DD57310780AA}" type="datetimeFigureOut">
               <a:rPr lang="en-AU" smtClean="0"/>
-              <a:t>12/01/2026</a:t>
+              <a:t>14/01/2026</a:t>
             </a:fld>
             <a:endParaRPr lang="en-AU"/>
           </a:p>
@@ -682,7 +1125,7 @@
           <a:p>
             <a:fld id="{E7B8E0CB-18B2-4FF0-B730-DD57310780AA}" type="datetimeFigureOut">
               <a:rPr lang="en-AU" smtClean="0"/>
-              <a:t>12/01/2026</a:t>
+              <a:t>14/01/2026</a:t>
             </a:fld>
             <a:endParaRPr lang="en-AU"/>
           </a:p>
@@ -882,7 +1325,7 @@
           <a:p>
             <a:fld id="{E7B8E0CB-18B2-4FF0-B730-DD57310780AA}" type="datetimeFigureOut">
               <a:rPr lang="en-AU" smtClean="0"/>
-              <a:t>12/01/2026</a:t>
+              <a:t>14/01/2026</a:t>
             </a:fld>
             <a:endParaRPr lang="en-AU"/>
           </a:p>
@@ -1158,7 +1601,7 @@
           <a:p>
             <a:fld id="{E7B8E0CB-18B2-4FF0-B730-DD57310780AA}" type="datetimeFigureOut">
               <a:rPr lang="en-AU" smtClean="0"/>
-              <a:t>12/01/2026</a:t>
+              <a:t>14/01/2026</a:t>
             </a:fld>
             <a:endParaRPr lang="en-AU"/>
           </a:p>
@@ -1426,7 +1869,7 @@
           <a:p>
             <a:fld id="{E7B8E0CB-18B2-4FF0-B730-DD57310780AA}" type="datetimeFigureOut">
               <a:rPr lang="en-AU" smtClean="0"/>
-              <a:t>12/01/2026</a:t>
+              <a:t>14/01/2026</a:t>
             </a:fld>
             <a:endParaRPr lang="en-AU"/>
           </a:p>
@@ -1841,7 +2284,7 @@
           <a:p>
             <a:fld id="{E7B8E0CB-18B2-4FF0-B730-DD57310780AA}" type="datetimeFigureOut">
               <a:rPr lang="en-AU" smtClean="0"/>
-              <a:t>12/01/2026</a:t>
+              <a:t>14/01/2026</a:t>
             </a:fld>
             <a:endParaRPr lang="en-AU"/>
           </a:p>
@@ -1983,7 +2426,7 @@
           <a:p>
             <a:fld id="{E7B8E0CB-18B2-4FF0-B730-DD57310780AA}" type="datetimeFigureOut">
               <a:rPr lang="en-AU" smtClean="0"/>
-              <a:t>12/01/2026</a:t>
+              <a:t>14/01/2026</a:t>
             </a:fld>
             <a:endParaRPr lang="en-AU"/>
           </a:p>
@@ -2096,7 +2539,7 @@
           <a:p>
             <a:fld id="{E7B8E0CB-18B2-4FF0-B730-DD57310780AA}" type="datetimeFigureOut">
               <a:rPr lang="en-AU" smtClean="0"/>
-              <a:t>12/01/2026</a:t>
+              <a:t>14/01/2026</a:t>
             </a:fld>
             <a:endParaRPr lang="en-AU"/>
           </a:p>
@@ -2409,7 +2852,7 @@
           <a:p>
             <a:fld id="{E7B8E0CB-18B2-4FF0-B730-DD57310780AA}" type="datetimeFigureOut">
               <a:rPr lang="en-AU" smtClean="0"/>
-              <a:t>12/01/2026</a:t>
+              <a:t>14/01/2026</a:t>
             </a:fld>
             <a:endParaRPr lang="en-AU"/>
           </a:p>
@@ -2698,7 +3141,7 @@
           <a:p>
             <a:fld id="{E7B8E0CB-18B2-4FF0-B730-DD57310780AA}" type="datetimeFigureOut">
               <a:rPr lang="en-AU" smtClean="0"/>
-              <a:t>12/01/2026</a:t>
+              <a:t>14/01/2026</a:t>
             </a:fld>
             <a:endParaRPr lang="en-AU"/>
           </a:p>
@@ -2941,7 +3384,7 @@
           <a:p>
             <a:fld id="{E7B8E0CB-18B2-4FF0-B730-DD57310780AA}" type="datetimeFigureOut">
               <a:rPr lang="en-AU" smtClean="0"/>
-              <a:t>12/01/2026</a:t>
+              <a:t>14/01/2026</a:t>
             </a:fld>
             <a:endParaRPr lang="en-AU"/>
           </a:p>
@@ -3446,185 +3889,6 @@
           <p:cNvPr id="2" name="Title 1">
             <a:extLst>
               <a:ext uri="{FF2B5EF4-FFF2-40B4-BE49-F238E27FC236}">
-                <a16:creationId xmlns:a16="http://schemas.microsoft.com/office/drawing/2014/main" id="{557B8F53-A3AA-C923-EF35-309BE6574596}"/>
-              </a:ext>
-            </a:extLst>
-          </p:cNvPr>
-          <p:cNvSpPr>
-            <a:spLocks noGrp="1"/>
-          </p:cNvSpPr>
-          <p:nvPr>
-            <p:ph type="title"/>
-          </p:nvPr>
-        </p:nvSpPr>
-        <p:spPr/>
-        <p:txBody>
-          <a:bodyPr/>
-          <a:lstStyle/>
-          <a:p>
-            <a:r>
-              <a:rPr lang="en-AU" dirty="0"/>
-              <a:t>View your Hunt output</a:t>
-            </a:r>
-          </a:p>
-        </p:txBody>
-      </p:sp>
-      <p:sp>
-        <p:nvSpPr>
-          <p:cNvPr id="3" name="Content Placeholder 2">
-            <a:extLst>
-              <a:ext uri="{FF2B5EF4-FFF2-40B4-BE49-F238E27FC236}">
-                <a16:creationId xmlns:a16="http://schemas.microsoft.com/office/drawing/2014/main" id="{CFAC1602-A5CE-C5A4-A0E3-CAB7978293D5}"/>
-              </a:ext>
-            </a:extLst>
-          </p:cNvPr>
-          <p:cNvSpPr>
-            <a:spLocks noGrp="1"/>
-          </p:cNvSpPr>
-          <p:nvPr>
-            <p:ph idx="1"/>
-          </p:nvPr>
-        </p:nvSpPr>
-        <p:spPr>
-          <a:xfrm>
-            <a:off x="683381" y="1883682"/>
-            <a:ext cx="10515600" cy="4351338"/>
-          </a:xfrm>
-        </p:spPr>
-        <p:txBody>
-          <a:bodyPr/>
-          <a:lstStyle/>
-          <a:p>
-            <a:r>
-              <a:rPr lang="en-AU" dirty="0"/>
-              <a:t>Check your hunt has finished running</a:t>
-            </a:r>
-          </a:p>
-          <a:p>
-            <a:endParaRPr lang="en-AU" dirty="0"/>
-          </a:p>
-          <a:p>
-            <a:endParaRPr lang="en-AU" dirty="0"/>
-          </a:p>
-          <a:p>
-            <a:endParaRPr lang="en-AU" dirty="0"/>
-          </a:p>
-          <a:p>
-            <a:r>
-              <a:rPr lang="en-AU" dirty="0"/>
-              <a:t>View your output </a:t>
-            </a:r>
-          </a:p>
-          <a:p>
-            <a:endParaRPr lang="en-AU" dirty="0"/>
-          </a:p>
-        </p:txBody>
-      </p:sp>
-      <p:pic>
-        <p:nvPicPr>
-          <p:cNvPr id="5" name="Picture 4">
-            <a:extLst>
-              <a:ext uri="{FF2B5EF4-FFF2-40B4-BE49-F238E27FC236}">
-                <a16:creationId xmlns:a16="http://schemas.microsoft.com/office/drawing/2014/main" id="{B6D3E260-340B-F8F3-9586-C16A45B60094}"/>
-              </a:ext>
-            </a:extLst>
-          </p:cNvPr>
-          <p:cNvPicPr>
-            <a:picLocks noChangeAspect="1"/>
-          </p:cNvPicPr>
-          <p:nvPr/>
-        </p:nvPicPr>
-        <p:blipFill>
-          <a:blip r:embed="rId2"/>
-          <a:stretch>
-            <a:fillRect/>
-          </a:stretch>
-        </p:blipFill>
-        <p:spPr>
-          <a:xfrm>
-            <a:off x="993019" y="2626919"/>
-            <a:ext cx="9211733" cy="1227055"/>
-          </a:xfrm>
-          <a:prstGeom prst="rect">
-            <a:avLst/>
-          </a:prstGeom>
-          <a:ln w="25400">
-            <a:solidFill>
-              <a:schemeClr val="tx1"/>
-            </a:solidFill>
-          </a:ln>
-        </p:spPr>
-      </p:pic>
-      <p:pic>
-        <p:nvPicPr>
-          <p:cNvPr id="7" name="Picture 6">
-            <a:extLst>
-              <a:ext uri="{FF2B5EF4-FFF2-40B4-BE49-F238E27FC236}">
-                <a16:creationId xmlns:a16="http://schemas.microsoft.com/office/drawing/2014/main" id="{CA1E53CD-4576-26E3-422E-B4A3AF8C5B96}"/>
-              </a:ext>
-            </a:extLst>
-          </p:cNvPr>
-          <p:cNvPicPr>
-            <a:picLocks noChangeAspect="1"/>
-          </p:cNvPicPr>
-          <p:nvPr/>
-        </p:nvPicPr>
-        <p:blipFill>
-          <a:blip r:embed="rId3"/>
-          <a:stretch>
-            <a:fillRect/>
-          </a:stretch>
-        </p:blipFill>
-        <p:spPr>
-          <a:xfrm>
-            <a:off x="3331029" y="4597211"/>
-            <a:ext cx="5220303" cy="1583833"/>
-          </a:xfrm>
-          <a:prstGeom prst="rect">
-            <a:avLst/>
-          </a:prstGeom>
-          <a:ln w="25400">
-            <a:solidFill>
-              <a:schemeClr val="tx1"/>
-            </a:solidFill>
-          </a:ln>
-        </p:spPr>
-      </p:pic>
-    </p:spTree>
-    <p:extLst>
-      <p:ext uri="{BB962C8B-B14F-4D97-AF65-F5344CB8AC3E}">
-        <p14:creationId xmlns:p14="http://schemas.microsoft.com/office/powerpoint/2010/main" val="2515542159"/>
-      </p:ext>
-    </p:extLst>
-  </p:cSld>
-  <p:clrMapOvr>
-    <a:masterClrMapping/>
-  </p:clrMapOvr>
-</p:sld>
-</file>
-
-<file path=ppt/slides/slide11.xml><?xml version="1.0" encoding="utf-8"?>
-<p:sld xmlns:a="http://schemas.openxmlformats.org/drawingml/2006/main" xmlns:r="http://schemas.openxmlformats.org/officeDocument/2006/relationships" xmlns:p="http://schemas.openxmlformats.org/presentationml/2006/main">
-  <p:cSld>
-    <p:spTree>
-      <p:nvGrpSpPr>
-        <p:cNvPr id="1" name=""/>
-        <p:cNvGrpSpPr/>
-        <p:nvPr/>
-      </p:nvGrpSpPr>
-      <p:grpSpPr>
-        <a:xfrm>
-          <a:off x="0" y="0"/>
-          <a:ext cx="0" cy="0"/>
-          <a:chOff x="0" y="0"/>
-          <a:chExt cx="0" cy="0"/>
-        </a:xfrm>
-      </p:grpSpPr>
-      <p:sp>
-        <p:nvSpPr>
-          <p:cNvPr id="2" name="Title 1">
-            <a:extLst>
-              <a:ext uri="{FF2B5EF4-FFF2-40B4-BE49-F238E27FC236}">
                 <a16:creationId xmlns:a16="http://schemas.microsoft.com/office/drawing/2014/main" id="{DA172071-52FF-68A4-B935-FBD32E0D2BA1}"/>
               </a:ext>
             </a:extLst>
@@ -3746,6 +4010,130 @@
 </p:sld>
 </file>
 
+<file path=ppt/slides/slide11.xml><?xml version="1.0" encoding="utf-8"?>
+<p:sld xmlns:a="http://schemas.openxmlformats.org/drawingml/2006/main" xmlns:r="http://schemas.openxmlformats.org/officeDocument/2006/relationships" xmlns:p="http://schemas.openxmlformats.org/presentationml/2006/main">
+  <p:cSld>
+    <p:spTree>
+      <p:nvGrpSpPr>
+        <p:cNvPr id="1" name=""/>
+        <p:cNvGrpSpPr/>
+        <p:nvPr/>
+      </p:nvGrpSpPr>
+      <p:grpSpPr>
+        <a:xfrm>
+          <a:off x="0" y="0"/>
+          <a:ext cx="0" cy="0"/>
+          <a:chOff x="0" y="0"/>
+          <a:chExt cx="0" cy="0"/>
+        </a:xfrm>
+      </p:grpSpPr>
+      <p:sp>
+        <p:nvSpPr>
+          <p:cNvPr id="2" name="Title 1">
+            <a:extLst>
+              <a:ext uri="{FF2B5EF4-FFF2-40B4-BE49-F238E27FC236}">
+                <a16:creationId xmlns:a16="http://schemas.microsoft.com/office/drawing/2014/main" id="{399FAA0C-1C16-1DDB-DAA0-0F24DAAAD5EA}"/>
+              </a:ext>
+            </a:extLst>
+          </p:cNvPr>
+          <p:cNvSpPr>
+            <a:spLocks noGrp="1"/>
+          </p:cNvSpPr>
+          <p:nvPr>
+            <p:ph type="title"/>
+          </p:nvPr>
+        </p:nvSpPr>
+        <p:spPr/>
+        <p:txBody>
+          <a:bodyPr/>
+          <a:lstStyle/>
+          <a:p>
+            <a:r>
+              <a:rPr lang="en-AU" dirty="0"/>
+              <a:t>Quarantine Host Machine</a:t>
+            </a:r>
+          </a:p>
+        </p:txBody>
+      </p:sp>
+      <p:sp>
+        <p:nvSpPr>
+          <p:cNvPr id="3" name="Content Placeholder 2">
+            <a:extLst>
+              <a:ext uri="{FF2B5EF4-FFF2-40B4-BE49-F238E27FC236}">
+                <a16:creationId xmlns:a16="http://schemas.microsoft.com/office/drawing/2014/main" id="{A996F671-384C-348F-8CD6-784691F1C4AC}"/>
+              </a:ext>
+            </a:extLst>
+          </p:cNvPr>
+          <p:cNvSpPr>
+            <a:spLocks noGrp="1"/>
+          </p:cNvSpPr>
+          <p:nvPr>
+            <p:ph idx="1"/>
+          </p:nvPr>
+        </p:nvSpPr>
+        <p:spPr/>
+        <p:txBody>
+          <a:bodyPr/>
+          <a:lstStyle/>
+          <a:p>
+            <a:r>
+              <a:rPr lang="en-AU" dirty="0"/>
+              <a:t>If a malicious behaviour is seen on one machine you are able to stop any communication to that machine and only your Velociraptor can communicate with it.</a:t>
+            </a:r>
+          </a:p>
+          <a:p>
+            <a:endParaRPr lang="en-AU" dirty="0"/>
+          </a:p>
+        </p:txBody>
+      </p:sp>
+      <p:pic>
+        <p:nvPicPr>
+          <p:cNvPr id="5" name="Picture 4">
+            <a:extLst>
+              <a:ext uri="{FF2B5EF4-FFF2-40B4-BE49-F238E27FC236}">
+                <a16:creationId xmlns:a16="http://schemas.microsoft.com/office/drawing/2014/main" id="{F7E4565E-6C88-63FE-B1FB-D00E119E1E34}"/>
+              </a:ext>
+            </a:extLst>
+          </p:cNvPr>
+          <p:cNvPicPr>
+            <a:picLocks noChangeAspect="1"/>
+          </p:cNvPicPr>
+          <p:nvPr/>
+        </p:nvPicPr>
+        <p:blipFill>
+          <a:blip r:embed="rId2"/>
+          <a:stretch>
+            <a:fillRect/>
+          </a:stretch>
+        </p:blipFill>
+        <p:spPr>
+          <a:xfrm>
+            <a:off x="4318944" y="3540286"/>
+            <a:ext cx="4008033" cy="2771614"/>
+          </a:xfrm>
+          <a:prstGeom prst="rect">
+            <a:avLst/>
+          </a:prstGeom>
+          <a:ln w="25400">
+            <a:solidFill>
+              <a:schemeClr val="tx1"/>
+            </a:solidFill>
+          </a:ln>
+        </p:spPr>
+      </p:pic>
+    </p:spTree>
+    <p:extLst>
+      <p:ext uri="{BB962C8B-B14F-4D97-AF65-F5344CB8AC3E}">
+        <p14:creationId xmlns:p14="http://schemas.microsoft.com/office/powerpoint/2010/main" val="3217401668"/>
+      </p:ext>
+    </p:extLst>
+  </p:cSld>
+  <p:clrMapOvr>
+    <a:masterClrMapping/>
+  </p:clrMapOvr>
+</p:sld>
+</file>
+
 <file path=ppt/slides/slide12.xml><?xml version="1.0" encoding="utf-8"?>
 <p:sld xmlns:a="http://schemas.openxmlformats.org/drawingml/2006/main" xmlns:r="http://schemas.openxmlformats.org/officeDocument/2006/relationships" xmlns:p="http://schemas.openxmlformats.org/presentationml/2006/main">
   <p:cSld>
@@ -3786,7 +4174,7 @@
           <a:p>
             <a:r>
               <a:rPr lang="en-AU" dirty="0"/>
-              <a:t>Get use to Velociraptor</a:t>
+              <a:t>Exposure To Velociraptor</a:t>
             </a:r>
           </a:p>
         </p:txBody>
@@ -3814,42 +4202,36 @@
           <a:p>
             <a:r>
               <a:rPr lang="en-AU" dirty="0"/>
-              <a:t>Run hunts</a:t>
-            </a:r>
-          </a:p>
-          <a:p>
+              <a:t>Create a hunt, configure artifacts pertaining to the following:</a:t>
+            </a:r>
+          </a:p>
+          <a:p>
+            <a:pPr lvl="1"/>
             <a:r>
               <a:rPr lang="en-AU" dirty="0"/>
-              <a:t>Run </a:t>
-            </a:r>
-            <a:r>
-              <a:rPr lang="en-AU" dirty="0" err="1"/>
-              <a:t>Powershell</a:t>
-            </a:r>
+              <a:t>Services</a:t>
+            </a:r>
+          </a:p>
+          <a:p>
+            <a:pPr lvl="1"/>
             <a:r>
               <a:rPr lang="en-AU" dirty="0"/>
-              <a:t> Commands</a:t>
-            </a:r>
-          </a:p>
-          <a:p>
+              <a:t>Scheduled Tasks</a:t>
+            </a:r>
+          </a:p>
+          <a:p>
+            <a:pPr lvl="1"/>
             <a:r>
               <a:rPr lang="en-AU" dirty="0"/>
-              <a:t>Figure out which hunts you would run in a DCI scenario</a:t>
-            </a:r>
-          </a:p>
-          <a:p>
-            <a:endParaRPr lang="en-AU" dirty="0"/>
-          </a:p>
-          <a:p>
+              <a:t>Computer Information</a:t>
+            </a:r>
+          </a:p>
+          <a:p>
+            <a:pPr lvl="1"/>
             <a:r>
               <a:rPr lang="en-AU" dirty="0"/>
-              <a:t>Immersive labs exercise </a:t>
-            </a:r>
-            <a:r>
-              <a:rPr lang="en-AU"/>
-              <a:t>if possible</a:t>
-            </a:r>
-            <a:endParaRPr lang="en-AU" dirty="0"/>
+              <a:t>Startup Run Keys</a:t>
+            </a:r>
           </a:p>
         </p:txBody>
       </p:sp>
@@ -4324,263 +4706,6 @@
           <p:cNvPr id="2" name="Title 1">
             <a:extLst>
               <a:ext uri="{FF2B5EF4-FFF2-40B4-BE49-F238E27FC236}">
-                <a16:creationId xmlns:a16="http://schemas.microsoft.com/office/drawing/2014/main" id="{399FAA0C-1C16-1DDB-DAA0-0F24DAAAD5EA}"/>
-              </a:ext>
-            </a:extLst>
-          </p:cNvPr>
-          <p:cNvSpPr>
-            <a:spLocks noGrp="1"/>
-          </p:cNvSpPr>
-          <p:nvPr>
-            <p:ph type="title"/>
-          </p:nvPr>
-        </p:nvSpPr>
-        <p:spPr/>
-        <p:txBody>
-          <a:bodyPr/>
-          <a:lstStyle/>
-          <a:p>
-            <a:r>
-              <a:rPr lang="en-AU" dirty="0"/>
-              <a:t>Quarantine Host Machine</a:t>
-            </a:r>
-          </a:p>
-        </p:txBody>
-      </p:sp>
-      <p:sp>
-        <p:nvSpPr>
-          <p:cNvPr id="3" name="Content Placeholder 2">
-            <a:extLst>
-              <a:ext uri="{FF2B5EF4-FFF2-40B4-BE49-F238E27FC236}">
-                <a16:creationId xmlns:a16="http://schemas.microsoft.com/office/drawing/2014/main" id="{A996F671-384C-348F-8CD6-784691F1C4AC}"/>
-              </a:ext>
-            </a:extLst>
-          </p:cNvPr>
-          <p:cNvSpPr>
-            <a:spLocks noGrp="1"/>
-          </p:cNvSpPr>
-          <p:nvPr>
-            <p:ph idx="1"/>
-          </p:nvPr>
-        </p:nvSpPr>
-        <p:spPr/>
-        <p:txBody>
-          <a:bodyPr/>
-          <a:lstStyle/>
-          <a:p>
-            <a:r>
-              <a:rPr lang="en-AU" dirty="0"/>
-              <a:t>If a malicious behaviour is seen on one machine you are able to stop any communication to that machine and only your Velociraptor can communicate with it.</a:t>
-            </a:r>
-          </a:p>
-          <a:p>
-            <a:endParaRPr lang="en-AU" dirty="0"/>
-          </a:p>
-        </p:txBody>
-      </p:sp>
-      <p:pic>
-        <p:nvPicPr>
-          <p:cNvPr id="5" name="Picture 4">
-            <a:extLst>
-              <a:ext uri="{FF2B5EF4-FFF2-40B4-BE49-F238E27FC236}">
-                <a16:creationId xmlns:a16="http://schemas.microsoft.com/office/drawing/2014/main" id="{F7E4565E-6C88-63FE-B1FB-D00E119E1E34}"/>
-              </a:ext>
-            </a:extLst>
-          </p:cNvPr>
-          <p:cNvPicPr>
-            <a:picLocks noChangeAspect="1"/>
-          </p:cNvPicPr>
-          <p:nvPr/>
-        </p:nvPicPr>
-        <p:blipFill>
-          <a:blip r:embed="rId2"/>
-          <a:stretch>
-            <a:fillRect/>
-          </a:stretch>
-        </p:blipFill>
-        <p:spPr>
-          <a:xfrm>
-            <a:off x="4318944" y="3540286"/>
-            <a:ext cx="4008033" cy="2771614"/>
-          </a:xfrm>
-          <a:prstGeom prst="rect">
-            <a:avLst/>
-          </a:prstGeom>
-          <a:ln w="25400">
-            <a:solidFill>
-              <a:schemeClr val="tx1"/>
-            </a:solidFill>
-          </a:ln>
-        </p:spPr>
-      </p:pic>
-    </p:spTree>
-    <p:extLst>
-      <p:ext uri="{BB962C8B-B14F-4D97-AF65-F5344CB8AC3E}">
-        <p14:creationId xmlns:p14="http://schemas.microsoft.com/office/powerpoint/2010/main" val="3217401668"/>
-      </p:ext>
-    </p:extLst>
-  </p:cSld>
-  <p:clrMapOvr>
-    <a:masterClrMapping/>
-  </p:clrMapOvr>
-</p:sld>
-</file>
-
-<file path=ppt/slides/slide7.xml><?xml version="1.0" encoding="utf-8"?>
-<p:sld xmlns:a="http://schemas.openxmlformats.org/drawingml/2006/main" xmlns:r="http://schemas.openxmlformats.org/officeDocument/2006/relationships" xmlns:p="http://schemas.openxmlformats.org/presentationml/2006/main">
-  <p:cSld>
-    <p:spTree>
-      <p:nvGrpSpPr>
-        <p:cNvPr id="1" name=""/>
-        <p:cNvGrpSpPr/>
-        <p:nvPr/>
-      </p:nvGrpSpPr>
-      <p:grpSpPr>
-        <a:xfrm>
-          <a:off x="0" y="0"/>
-          <a:ext cx="0" cy="0"/>
-          <a:chOff x="0" y="0"/>
-          <a:chExt cx="0" cy="0"/>
-        </a:xfrm>
-      </p:grpSpPr>
-      <p:sp>
-        <p:nvSpPr>
-          <p:cNvPr id="2" name="Title 1">
-            <a:extLst>
-              <a:ext uri="{FF2B5EF4-FFF2-40B4-BE49-F238E27FC236}">
-                <a16:creationId xmlns:a16="http://schemas.microsoft.com/office/drawing/2014/main" id="{A87403A7-BB95-052A-39DE-34E226B7F90F}"/>
-              </a:ext>
-            </a:extLst>
-          </p:cNvPr>
-          <p:cNvSpPr>
-            <a:spLocks noGrp="1"/>
-          </p:cNvSpPr>
-          <p:nvPr>
-            <p:ph type="title"/>
-          </p:nvPr>
-        </p:nvSpPr>
-        <p:spPr/>
-        <p:txBody>
-          <a:bodyPr/>
-          <a:lstStyle/>
-          <a:p>
-            <a:r>
-              <a:rPr lang="en-AU" dirty="0"/>
-              <a:t>Virtual File System</a:t>
-            </a:r>
-          </a:p>
-        </p:txBody>
-      </p:sp>
-      <p:sp>
-        <p:nvSpPr>
-          <p:cNvPr id="3" name="Content Placeholder 2">
-            <a:extLst>
-              <a:ext uri="{FF2B5EF4-FFF2-40B4-BE49-F238E27FC236}">
-                <a16:creationId xmlns:a16="http://schemas.microsoft.com/office/drawing/2014/main" id="{EE62E597-6150-77E8-CA06-EE00EFC8B7AA}"/>
-              </a:ext>
-            </a:extLst>
-          </p:cNvPr>
-          <p:cNvSpPr>
-            <a:spLocks noGrp="1"/>
-          </p:cNvSpPr>
-          <p:nvPr>
-            <p:ph idx="1"/>
-          </p:nvPr>
-        </p:nvSpPr>
-        <p:spPr/>
-        <p:txBody>
-          <a:bodyPr/>
-          <a:lstStyle/>
-          <a:p>
-            <a:r>
-              <a:rPr lang="en-AU" dirty="0"/>
-              <a:t>Can view the directory and the MAC time of files</a:t>
-            </a:r>
-          </a:p>
-          <a:p>
-            <a:r>
-              <a:rPr lang="en-AU" dirty="0"/>
-              <a:t>Able to extract files and get hashes and do further malware analyse.  </a:t>
-            </a:r>
-          </a:p>
-          <a:p>
-            <a:endParaRPr lang="en-AU" dirty="0"/>
-          </a:p>
-          <a:p>
-            <a:endParaRPr lang="en-AU" dirty="0"/>
-          </a:p>
-        </p:txBody>
-      </p:sp>
-      <p:pic>
-        <p:nvPicPr>
-          <p:cNvPr id="5" name="Picture 4">
-            <a:extLst>
-              <a:ext uri="{FF2B5EF4-FFF2-40B4-BE49-F238E27FC236}">
-                <a16:creationId xmlns:a16="http://schemas.microsoft.com/office/drawing/2014/main" id="{1833317E-6378-F7C3-4617-09644363503B}"/>
-              </a:ext>
-            </a:extLst>
-          </p:cNvPr>
-          <p:cNvPicPr>
-            <a:picLocks noChangeAspect="1"/>
-          </p:cNvPicPr>
-          <p:nvPr/>
-        </p:nvPicPr>
-        <p:blipFill>
-          <a:blip r:embed="rId2"/>
-          <a:stretch>
-            <a:fillRect/>
-          </a:stretch>
-        </p:blipFill>
-        <p:spPr>
-          <a:xfrm>
-            <a:off x="3188305" y="3525612"/>
-            <a:ext cx="5815390" cy="2503522"/>
-          </a:xfrm>
-          <a:prstGeom prst="rect">
-            <a:avLst/>
-          </a:prstGeom>
-          <a:ln w="25400">
-            <a:solidFill>
-              <a:schemeClr val="tx1"/>
-            </a:solidFill>
-          </a:ln>
-        </p:spPr>
-      </p:pic>
-    </p:spTree>
-    <p:extLst>
-      <p:ext uri="{BB962C8B-B14F-4D97-AF65-F5344CB8AC3E}">
-        <p14:creationId xmlns:p14="http://schemas.microsoft.com/office/powerpoint/2010/main" val="4121112682"/>
-      </p:ext>
-    </p:extLst>
-  </p:cSld>
-  <p:clrMapOvr>
-    <a:masterClrMapping/>
-  </p:clrMapOvr>
-</p:sld>
-</file>
-
-<file path=ppt/slides/slide8.xml><?xml version="1.0" encoding="utf-8"?>
-<p:sld xmlns:a="http://schemas.openxmlformats.org/drawingml/2006/main" xmlns:r="http://schemas.openxmlformats.org/officeDocument/2006/relationships" xmlns:p="http://schemas.openxmlformats.org/presentationml/2006/main">
-  <p:cSld>
-    <p:spTree>
-      <p:nvGrpSpPr>
-        <p:cNvPr id="1" name=""/>
-        <p:cNvGrpSpPr/>
-        <p:nvPr/>
-      </p:nvGrpSpPr>
-      <p:grpSpPr>
-        <a:xfrm>
-          <a:off x="0" y="0"/>
-          <a:ext cx="0" cy="0"/>
-          <a:chOff x="0" y="0"/>
-          <a:chExt cx="0" cy="0"/>
-        </a:xfrm>
-      </p:grpSpPr>
-      <p:sp>
-        <p:nvSpPr>
-          <p:cNvPr id="2" name="Title 1">
-            <a:extLst>
-              <a:ext uri="{FF2B5EF4-FFF2-40B4-BE49-F238E27FC236}">
                 <a16:creationId xmlns:a16="http://schemas.microsoft.com/office/drawing/2014/main" id="{219B2E74-CD29-68E3-3B50-F88D0B3BB985}"/>
               </a:ext>
             </a:extLst>
@@ -4721,7 +4846,7 @@
 </p:sld>
 </file>
 
-<file path=ppt/slides/slide9.xml><?xml version="1.0" encoding="utf-8"?>
+<file path=ppt/slides/slide7.xml><?xml version="1.0" encoding="utf-8"?>
 <p:sld xmlns:a="http://schemas.openxmlformats.org/drawingml/2006/main" xmlns:r="http://schemas.openxmlformats.org/officeDocument/2006/relationships" xmlns:p="http://schemas.openxmlformats.org/presentationml/2006/main">
   <p:cSld>
     <p:spTree>
@@ -4847,6 +4972,318 @@
     <p:extLst>
       <p:ext uri="{BB962C8B-B14F-4D97-AF65-F5344CB8AC3E}">
         <p14:creationId xmlns:p14="http://schemas.microsoft.com/office/powerpoint/2010/main" val="828334266"/>
+      </p:ext>
+    </p:extLst>
+  </p:cSld>
+  <p:clrMapOvr>
+    <a:masterClrMapping/>
+  </p:clrMapOvr>
+</p:sld>
+</file>
+
+<file path=ppt/slides/slide8.xml><?xml version="1.0" encoding="utf-8"?>
+<p:sld xmlns:a="http://schemas.openxmlformats.org/drawingml/2006/main" xmlns:r="http://schemas.openxmlformats.org/officeDocument/2006/relationships" xmlns:p="http://schemas.openxmlformats.org/presentationml/2006/main">
+  <p:cSld>
+    <p:spTree>
+      <p:nvGrpSpPr>
+        <p:cNvPr id="1" name=""/>
+        <p:cNvGrpSpPr/>
+        <p:nvPr/>
+      </p:nvGrpSpPr>
+      <p:grpSpPr>
+        <a:xfrm>
+          <a:off x="0" y="0"/>
+          <a:ext cx="0" cy="0"/>
+          <a:chOff x="0" y="0"/>
+          <a:chExt cx="0" cy="0"/>
+        </a:xfrm>
+      </p:grpSpPr>
+      <p:sp>
+        <p:nvSpPr>
+          <p:cNvPr id="2" name="Title 1">
+            <a:extLst>
+              <a:ext uri="{FF2B5EF4-FFF2-40B4-BE49-F238E27FC236}">
+                <a16:creationId xmlns:a16="http://schemas.microsoft.com/office/drawing/2014/main" id="{557B8F53-A3AA-C923-EF35-309BE6574596}"/>
+              </a:ext>
+            </a:extLst>
+          </p:cNvPr>
+          <p:cNvSpPr>
+            <a:spLocks noGrp="1"/>
+          </p:cNvSpPr>
+          <p:nvPr>
+            <p:ph type="title"/>
+          </p:nvPr>
+        </p:nvSpPr>
+        <p:spPr/>
+        <p:txBody>
+          <a:bodyPr/>
+          <a:lstStyle/>
+          <a:p>
+            <a:r>
+              <a:rPr lang="en-AU" dirty="0"/>
+              <a:t>View your Hunt output</a:t>
+            </a:r>
+          </a:p>
+        </p:txBody>
+      </p:sp>
+      <p:sp>
+        <p:nvSpPr>
+          <p:cNvPr id="3" name="Content Placeholder 2">
+            <a:extLst>
+              <a:ext uri="{FF2B5EF4-FFF2-40B4-BE49-F238E27FC236}">
+                <a16:creationId xmlns:a16="http://schemas.microsoft.com/office/drawing/2014/main" id="{CFAC1602-A5CE-C5A4-A0E3-CAB7978293D5}"/>
+              </a:ext>
+            </a:extLst>
+          </p:cNvPr>
+          <p:cNvSpPr>
+            <a:spLocks noGrp="1"/>
+          </p:cNvSpPr>
+          <p:nvPr>
+            <p:ph idx="1"/>
+          </p:nvPr>
+        </p:nvSpPr>
+        <p:spPr>
+          <a:xfrm>
+            <a:off x="683381" y="1883682"/>
+            <a:ext cx="10515600" cy="4351338"/>
+          </a:xfrm>
+        </p:spPr>
+        <p:txBody>
+          <a:bodyPr/>
+          <a:lstStyle/>
+          <a:p>
+            <a:r>
+              <a:rPr lang="en-AU" dirty="0"/>
+              <a:t>Check your hunt has finished running</a:t>
+            </a:r>
+          </a:p>
+          <a:p>
+            <a:endParaRPr lang="en-AU" dirty="0"/>
+          </a:p>
+          <a:p>
+            <a:endParaRPr lang="en-AU" dirty="0"/>
+          </a:p>
+          <a:p>
+            <a:endParaRPr lang="en-AU" dirty="0"/>
+          </a:p>
+          <a:p>
+            <a:r>
+              <a:rPr lang="en-AU" dirty="0"/>
+              <a:t>View your output </a:t>
+            </a:r>
+          </a:p>
+          <a:p>
+            <a:endParaRPr lang="en-AU" dirty="0"/>
+          </a:p>
+        </p:txBody>
+      </p:sp>
+      <p:pic>
+        <p:nvPicPr>
+          <p:cNvPr id="5" name="Picture 4">
+            <a:extLst>
+              <a:ext uri="{FF2B5EF4-FFF2-40B4-BE49-F238E27FC236}">
+                <a16:creationId xmlns:a16="http://schemas.microsoft.com/office/drawing/2014/main" id="{B6D3E260-340B-F8F3-9586-C16A45B60094}"/>
+              </a:ext>
+            </a:extLst>
+          </p:cNvPr>
+          <p:cNvPicPr>
+            <a:picLocks noChangeAspect="1"/>
+          </p:cNvPicPr>
+          <p:nvPr/>
+        </p:nvPicPr>
+        <p:blipFill>
+          <a:blip r:embed="rId2"/>
+          <a:stretch>
+            <a:fillRect/>
+          </a:stretch>
+        </p:blipFill>
+        <p:spPr>
+          <a:xfrm>
+            <a:off x="993019" y="2626919"/>
+            <a:ext cx="9211733" cy="1227055"/>
+          </a:xfrm>
+          <a:prstGeom prst="rect">
+            <a:avLst/>
+          </a:prstGeom>
+          <a:ln w="25400">
+            <a:solidFill>
+              <a:schemeClr val="tx1"/>
+            </a:solidFill>
+          </a:ln>
+        </p:spPr>
+      </p:pic>
+      <p:pic>
+        <p:nvPicPr>
+          <p:cNvPr id="7" name="Picture 6">
+            <a:extLst>
+              <a:ext uri="{FF2B5EF4-FFF2-40B4-BE49-F238E27FC236}">
+                <a16:creationId xmlns:a16="http://schemas.microsoft.com/office/drawing/2014/main" id="{CA1E53CD-4576-26E3-422E-B4A3AF8C5B96}"/>
+              </a:ext>
+            </a:extLst>
+          </p:cNvPr>
+          <p:cNvPicPr>
+            <a:picLocks noChangeAspect="1"/>
+          </p:cNvPicPr>
+          <p:nvPr/>
+        </p:nvPicPr>
+        <p:blipFill>
+          <a:blip r:embed="rId3"/>
+          <a:stretch>
+            <a:fillRect/>
+          </a:stretch>
+        </p:blipFill>
+        <p:spPr>
+          <a:xfrm>
+            <a:off x="3331029" y="4597211"/>
+            <a:ext cx="5220303" cy="1583833"/>
+          </a:xfrm>
+          <a:prstGeom prst="rect">
+            <a:avLst/>
+          </a:prstGeom>
+          <a:ln w="25400">
+            <a:solidFill>
+              <a:schemeClr val="tx1"/>
+            </a:solidFill>
+          </a:ln>
+        </p:spPr>
+      </p:pic>
+    </p:spTree>
+    <p:extLst>
+      <p:ext uri="{BB962C8B-B14F-4D97-AF65-F5344CB8AC3E}">
+        <p14:creationId xmlns:p14="http://schemas.microsoft.com/office/powerpoint/2010/main" val="2515542159"/>
+      </p:ext>
+    </p:extLst>
+  </p:cSld>
+  <p:clrMapOvr>
+    <a:masterClrMapping/>
+  </p:clrMapOvr>
+</p:sld>
+</file>
+
+<file path=ppt/slides/slide9.xml><?xml version="1.0" encoding="utf-8"?>
+<p:sld xmlns:a="http://schemas.openxmlformats.org/drawingml/2006/main" xmlns:r="http://schemas.openxmlformats.org/officeDocument/2006/relationships" xmlns:p="http://schemas.openxmlformats.org/presentationml/2006/main">
+  <p:cSld>
+    <p:spTree>
+      <p:nvGrpSpPr>
+        <p:cNvPr id="1" name=""/>
+        <p:cNvGrpSpPr/>
+        <p:nvPr/>
+      </p:nvGrpSpPr>
+      <p:grpSpPr>
+        <a:xfrm>
+          <a:off x="0" y="0"/>
+          <a:ext cx="0" cy="0"/>
+          <a:chOff x="0" y="0"/>
+          <a:chExt cx="0" cy="0"/>
+        </a:xfrm>
+      </p:grpSpPr>
+      <p:sp>
+        <p:nvSpPr>
+          <p:cNvPr id="2" name="Title 1">
+            <a:extLst>
+              <a:ext uri="{FF2B5EF4-FFF2-40B4-BE49-F238E27FC236}">
+                <a16:creationId xmlns:a16="http://schemas.microsoft.com/office/drawing/2014/main" id="{A87403A7-BB95-052A-39DE-34E226B7F90F}"/>
+              </a:ext>
+            </a:extLst>
+          </p:cNvPr>
+          <p:cNvSpPr>
+            <a:spLocks noGrp="1"/>
+          </p:cNvSpPr>
+          <p:nvPr>
+            <p:ph type="title"/>
+          </p:nvPr>
+        </p:nvSpPr>
+        <p:spPr/>
+        <p:txBody>
+          <a:bodyPr/>
+          <a:lstStyle/>
+          <a:p>
+            <a:r>
+              <a:rPr lang="en-AU" dirty="0"/>
+              <a:t>Virtual File System</a:t>
+            </a:r>
+          </a:p>
+        </p:txBody>
+      </p:sp>
+      <p:sp>
+        <p:nvSpPr>
+          <p:cNvPr id="3" name="Content Placeholder 2">
+            <a:extLst>
+              <a:ext uri="{FF2B5EF4-FFF2-40B4-BE49-F238E27FC236}">
+                <a16:creationId xmlns:a16="http://schemas.microsoft.com/office/drawing/2014/main" id="{EE62E597-6150-77E8-CA06-EE00EFC8B7AA}"/>
+              </a:ext>
+            </a:extLst>
+          </p:cNvPr>
+          <p:cNvSpPr>
+            <a:spLocks noGrp="1"/>
+          </p:cNvSpPr>
+          <p:nvPr>
+            <p:ph idx="1"/>
+          </p:nvPr>
+        </p:nvSpPr>
+        <p:spPr/>
+        <p:txBody>
+          <a:bodyPr/>
+          <a:lstStyle/>
+          <a:p>
+            <a:r>
+              <a:rPr lang="en-AU" dirty="0"/>
+              <a:t>Can view the directory and the MAC time of files</a:t>
+            </a:r>
+          </a:p>
+          <a:p>
+            <a:r>
+              <a:rPr lang="en-AU" dirty="0"/>
+              <a:t>Able to extract files and get hashes and do further malware analyse.  </a:t>
+            </a:r>
+          </a:p>
+          <a:p>
+            <a:endParaRPr lang="en-AU" dirty="0"/>
+          </a:p>
+          <a:p>
+            <a:endParaRPr lang="en-AU" dirty="0"/>
+          </a:p>
+        </p:txBody>
+      </p:sp>
+      <p:pic>
+        <p:nvPicPr>
+          <p:cNvPr id="5" name="Picture 4">
+            <a:extLst>
+              <a:ext uri="{FF2B5EF4-FFF2-40B4-BE49-F238E27FC236}">
+                <a16:creationId xmlns:a16="http://schemas.microsoft.com/office/drawing/2014/main" id="{1833317E-6378-F7C3-4617-09644363503B}"/>
+              </a:ext>
+            </a:extLst>
+          </p:cNvPr>
+          <p:cNvPicPr>
+            <a:picLocks noChangeAspect="1"/>
+          </p:cNvPicPr>
+          <p:nvPr/>
+        </p:nvPicPr>
+        <p:blipFill>
+          <a:blip r:embed="rId2"/>
+          <a:stretch>
+            <a:fillRect/>
+          </a:stretch>
+        </p:blipFill>
+        <p:spPr>
+          <a:xfrm>
+            <a:off x="3188305" y="3525612"/>
+            <a:ext cx="5815390" cy="2503522"/>
+          </a:xfrm>
+          <a:prstGeom prst="rect">
+            <a:avLst/>
+          </a:prstGeom>
+          <a:ln w="25400">
+            <a:solidFill>
+              <a:schemeClr val="tx1"/>
+            </a:solidFill>
+          </a:ln>
+        </p:spPr>
+      </p:pic>
+    </p:spTree>
+    <p:extLst>
+      <p:ext uri="{BB962C8B-B14F-4D97-AF65-F5344CB8AC3E}">
+        <p14:creationId xmlns:p14="http://schemas.microsoft.com/office/powerpoint/2010/main" val="4121112682"/>
       </p:ext>
     </p:extLst>
   </p:cSld>
@@ -5169,4 +5606,319 @@
     </a:ext>
   </a:extLst>
 </a:theme>
+</file>
+
+<file path=ppt/theme/theme2.xml><?xml version="1.0" encoding="utf-8"?>
+<a:theme xmlns:a="http://schemas.openxmlformats.org/drawingml/2006/main" name="Office Theme">
+  <a:themeElements>
+    <a:clrScheme name="Office">
+      <a:dk1>
+        <a:sysClr val="windowText" lastClr="000000"/>
+      </a:dk1>
+      <a:lt1>
+        <a:sysClr val="window" lastClr="FFFFFF"/>
+      </a:lt1>
+      <a:dk2>
+        <a:srgbClr val="0E2841"/>
+      </a:dk2>
+      <a:lt2>
+        <a:srgbClr val="E8E8E8"/>
+      </a:lt2>
+      <a:accent1>
+        <a:srgbClr val="156082"/>
+      </a:accent1>
+      <a:accent2>
+        <a:srgbClr val="E97132"/>
+      </a:accent2>
+      <a:accent3>
+        <a:srgbClr val="196B24"/>
+      </a:accent3>
+      <a:accent4>
+        <a:srgbClr val="0F9ED5"/>
+      </a:accent4>
+      <a:accent5>
+        <a:srgbClr val="A02B93"/>
+      </a:accent5>
+      <a:accent6>
+        <a:srgbClr val="4EA72E"/>
+      </a:accent6>
+      <a:hlink>
+        <a:srgbClr val="467886"/>
+      </a:hlink>
+      <a:folHlink>
+        <a:srgbClr val="96607D"/>
+      </a:folHlink>
+    </a:clrScheme>
+    <a:fontScheme name="Office">
+      <a:majorFont>
+        <a:latin typeface="Aptos Display" panose="02110004020202020204"/>
+        <a:ea typeface=""/>
+        <a:cs typeface=""/>
+        <a:font script="Jpan" typeface="游ゴシック Light"/>
+        <a:font script="Hang" typeface="맑은 고딕"/>
+        <a:font script="Hans" typeface="等线 Light"/>
+        <a:font script="Hant" typeface="新細明體"/>
+        <a:font script="Arab" typeface="Times New Roman"/>
+        <a:font script="Hebr" typeface="Times New Roman"/>
+        <a:font script="Thai" typeface="Angsana New"/>
+        <a:font script="Ethi" typeface="Nyala"/>
+        <a:font script="Beng" typeface="Vrinda"/>
+        <a:font script="Gujr" typeface="Shruti"/>
+        <a:font script="Khmr" typeface="MoolBoran"/>
+        <a:font script="Knda" typeface="Tunga"/>
+        <a:font script="Guru" typeface="Raavi"/>
+        <a:font script="Cans" typeface="Euphemia"/>
+        <a:font script="Cher" typeface="Plantagenet Cherokee"/>
+        <a:font script="Yiii" typeface="Microsoft Yi Baiti"/>
+        <a:font script="Tibt" typeface="Microsoft Himalaya"/>
+        <a:font script="Thaa" typeface="MV Boli"/>
+        <a:font script="Deva" typeface="Mangal"/>
+        <a:font script="Telu" typeface="Gautami"/>
+        <a:font script="Taml" typeface="Latha"/>
+        <a:font script="Syrc" typeface="Estrangelo Edessa"/>
+        <a:font script="Orya" typeface="Kalinga"/>
+        <a:font script="Mlym" typeface="Kartika"/>
+        <a:font script="Laoo" typeface="DokChampa"/>
+        <a:font script="Sinh" typeface="Iskoola Pota"/>
+        <a:font script="Mong" typeface="Mongolian Baiti"/>
+        <a:font script="Viet" typeface="Times New Roman"/>
+        <a:font script="Uigh" typeface="Microsoft Uighur"/>
+        <a:font script="Geor" typeface="Sylfaen"/>
+        <a:font script="Armn" typeface="Arial"/>
+        <a:font script="Bugi" typeface="Leelawadee UI"/>
+        <a:font script="Bopo" typeface="Microsoft JhengHei"/>
+        <a:font script="Java" typeface="Javanese Text"/>
+        <a:font script="Lisu" typeface="Segoe UI"/>
+        <a:font script="Mymr" typeface="Myanmar Text"/>
+        <a:font script="Nkoo" typeface="Ebrima"/>
+        <a:font script="Olck" typeface="Nirmala UI"/>
+        <a:font script="Osma" typeface="Ebrima"/>
+        <a:font script="Phag" typeface="Phagspa"/>
+        <a:font script="Syrn" typeface="Estrangelo Edessa"/>
+        <a:font script="Syrj" typeface="Estrangelo Edessa"/>
+        <a:font script="Syre" typeface="Estrangelo Edessa"/>
+        <a:font script="Sora" typeface="Nirmala UI"/>
+        <a:font script="Tale" typeface="Microsoft Tai Le"/>
+        <a:font script="Talu" typeface="Microsoft New Tai Lue"/>
+        <a:font script="Tfng" typeface="Ebrima"/>
+      </a:majorFont>
+      <a:minorFont>
+        <a:latin typeface="Aptos" panose="02110004020202020204"/>
+        <a:ea typeface=""/>
+        <a:cs typeface=""/>
+        <a:font script="Jpan" typeface="游ゴシック"/>
+        <a:font script="Hang" typeface="맑은 고딕"/>
+        <a:font script="Hans" typeface="等线"/>
+        <a:font script="Hant" typeface="新細明體"/>
+        <a:font script="Arab" typeface="Arial"/>
+        <a:font script="Hebr" typeface="Arial"/>
+        <a:font script="Thai" typeface="Cordia New"/>
+        <a:font script="Ethi" typeface="Nyala"/>
+        <a:font script="Beng" typeface="Vrinda"/>
+        <a:font script="Gujr" typeface="Shruti"/>
+        <a:font script="Khmr" typeface="DaunPenh"/>
+        <a:font script="Knda" typeface="Tunga"/>
+        <a:font script="Guru" typeface="Raavi"/>
+        <a:font script="Cans" typeface="Euphemia"/>
+        <a:font script="Cher" typeface="Plantagenet Cherokee"/>
+        <a:font script="Yiii" typeface="Microsoft Yi Baiti"/>
+        <a:font script="Tibt" typeface="Microsoft Himalaya"/>
+        <a:font script="Thaa" typeface="MV Boli"/>
+        <a:font script="Deva" typeface="Mangal"/>
+        <a:font script="Telu" typeface="Gautami"/>
+        <a:font script="Taml" typeface="Latha"/>
+        <a:font script="Syrc" typeface="Estrangelo Edessa"/>
+        <a:font script="Orya" typeface="Kalinga"/>
+        <a:font script="Mlym" typeface="Kartika"/>
+        <a:font script="Laoo" typeface="DokChampa"/>
+        <a:font script="Sinh" typeface="Iskoola Pota"/>
+        <a:font script="Mong" typeface="Mongolian Baiti"/>
+        <a:font script="Viet" typeface="Arial"/>
+        <a:font script="Uigh" typeface="Microsoft Uighur"/>
+        <a:font script="Geor" typeface="Sylfaen"/>
+        <a:font script="Armn" typeface="Arial"/>
+        <a:font script="Bugi" typeface="Leelawadee UI"/>
+        <a:font script="Bopo" typeface="Microsoft JhengHei"/>
+        <a:font script="Java" typeface="Javanese Text"/>
+        <a:font script="Lisu" typeface="Segoe UI"/>
+        <a:font script="Mymr" typeface="Myanmar Text"/>
+        <a:font script="Nkoo" typeface="Ebrima"/>
+        <a:font script="Olck" typeface="Nirmala UI"/>
+        <a:font script="Osma" typeface="Ebrima"/>
+        <a:font script="Phag" typeface="Phagspa"/>
+        <a:font script="Syrn" typeface="Estrangelo Edessa"/>
+        <a:font script="Syrj" typeface="Estrangelo Edessa"/>
+        <a:font script="Syre" typeface="Estrangelo Edessa"/>
+        <a:font script="Sora" typeface="Nirmala UI"/>
+        <a:font script="Tale" typeface="Microsoft Tai Le"/>
+        <a:font script="Talu" typeface="Microsoft New Tai Lue"/>
+        <a:font script="Tfng" typeface="Ebrima"/>
+      </a:minorFont>
+    </a:fontScheme>
+    <a:fmtScheme name="Office">
+      <a:fillStyleLst>
+        <a:solidFill>
+          <a:schemeClr val="phClr"/>
+        </a:solidFill>
+        <a:gradFill rotWithShape="1">
+          <a:gsLst>
+            <a:gs pos="0">
+              <a:schemeClr val="phClr">
+                <a:lumMod val="110000"/>
+                <a:satMod val="105000"/>
+                <a:tint val="67000"/>
+              </a:schemeClr>
+            </a:gs>
+            <a:gs pos="50000">
+              <a:schemeClr val="phClr">
+                <a:lumMod val="105000"/>
+                <a:satMod val="103000"/>
+                <a:tint val="73000"/>
+              </a:schemeClr>
+            </a:gs>
+            <a:gs pos="100000">
+              <a:schemeClr val="phClr">
+                <a:lumMod val="105000"/>
+                <a:satMod val="109000"/>
+                <a:tint val="81000"/>
+              </a:schemeClr>
+            </a:gs>
+          </a:gsLst>
+          <a:lin ang="5400000" scaled="0"/>
+        </a:gradFill>
+        <a:gradFill rotWithShape="1">
+          <a:gsLst>
+            <a:gs pos="0">
+              <a:schemeClr val="phClr">
+                <a:satMod val="103000"/>
+                <a:lumMod val="102000"/>
+                <a:tint val="94000"/>
+              </a:schemeClr>
+            </a:gs>
+            <a:gs pos="50000">
+              <a:schemeClr val="phClr">
+                <a:satMod val="110000"/>
+                <a:lumMod val="100000"/>
+                <a:shade val="100000"/>
+              </a:schemeClr>
+            </a:gs>
+            <a:gs pos="100000">
+              <a:schemeClr val="phClr">
+                <a:lumMod val="99000"/>
+                <a:satMod val="120000"/>
+                <a:shade val="78000"/>
+              </a:schemeClr>
+            </a:gs>
+          </a:gsLst>
+          <a:lin ang="5400000" scaled="0"/>
+        </a:gradFill>
+      </a:fillStyleLst>
+      <a:lnStyleLst>
+        <a:ln w="12700" cap="flat" cmpd="sng" algn="ctr">
+          <a:solidFill>
+            <a:schemeClr val="phClr"/>
+          </a:solidFill>
+          <a:prstDash val="solid"/>
+          <a:miter lim="800000"/>
+        </a:ln>
+        <a:ln w="19050" cap="flat" cmpd="sng" algn="ctr">
+          <a:solidFill>
+            <a:schemeClr val="phClr"/>
+          </a:solidFill>
+          <a:prstDash val="solid"/>
+          <a:miter lim="800000"/>
+        </a:ln>
+        <a:ln w="25400" cap="flat" cmpd="sng" algn="ctr">
+          <a:solidFill>
+            <a:schemeClr val="phClr"/>
+          </a:solidFill>
+          <a:prstDash val="solid"/>
+          <a:miter lim="800000"/>
+        </a:ln>
+      </a:lnStyleLst>
+      <a:effectStyleLst>
+        <a:effectStyle>
+          <a:effectLst/>
+        </a:effectStyle>
+        <a:effectStyle>
+          <a:effectLst/>
+        </a:effectStyle>
+        <a:effectStyle>
+          <a:effectLst>
+            <a:outerShdw blurRad="57150" dist="19050" dir="5400000" algn="ctr" rotWithShape="0">
+              <a:srgbClr val="000000">
+                <a:alpha val="63000"/>
+              </a:srgbClr>
+            </a:outerShdw>
+          </a:effectLst>
+        </a:effectStyle>
+      </a:effectStyleLst>
+      <a:bgFillStyleLst>
+        <a:solidFill>
+          <a:schemeClr val="phClr"/>
+        </a:solidFill>
+        <a:solidFill>
+          <a:schemeClr val="phClr">
+            <a:tint val="95000"/>
+            <a:satMod val="170000"/>
+          </a:schemeClr>
+        </a:solidFill>
+        <a:gradFill rotWithShape="1">
+          <a:gsLst>
+            <a:gs pos="0">
+              <a:schemeClr val="phClr">
+                <a:tint val="93000"/>
+                <a:satMod val="150000"/>
+                <a:shade val="98000"/>
+                <a:lumMod val="102000"/>
+              </a:schemeClr>
+            </a:gs>
+            <a:gs pos="50000">
+              <a:schemeClr val="phClr">
+                <a:tint val="98000"/>
+                <a:satMod val="130000"/>
+                <a:shade val="90000"/>
+                <a:lumMod val="103000"/>
+              </a:schemeClr>
+            </a:gs>
+            <a:gs pos="100000">
+              <a:schemeClr val="phClr">
+                <a:shade val="63000"/>
+                <a:satMod val="120000"/>
+              </a:schemeClr>
+            </a:gs>
+          </a:gsLst>
+          <a:lin ang="5400000" scaled="0"/>
+        </a:gradFill>
+      </a:bgFillStyleLst>
+    </a:fmtScheme>
+  </a:themeElements>
+  <a:objectDefaults>
+    <a:lnDef>
+      <a:spPr/>
+      <a:bodyPr/>
+      <a:lstStyle/>
+      <a:style>
+        <a:lnRef idx="2">
+          <a:schemeClr val="accent1"/>
+        </a:lnRef>
+        <a:fillRef idx="0">
+          <a:schemeClr val="accent1"/>
+        </a:fillRef>
+        <a:effectRef idx="1">
+          <a:schemeClr val="accent1"/>
+        </a:effectRef>
+        <a:fontRef idx="minor">
+          <a:schemeClr val="tx1"/>
+        </a:fontRef>
+      </a:style>
+    </a:lnDef>
+  </a:objectDefaults>
+  <a:extraClrSchemeLst/>
+  <a:extLst>
+    <a:ext uri="{05A4C25C-085E-4340-85A3-A5531E510DB2}">
+      <thm15:themeFamily xmlns:thm15="http://schemas.microsoft.com/office/thememl/2012/main" name="Office Theme" id="{2E142A2C-CD16-42D6-873A-C26D2A0506FA}" vid="{1BDDFF52-6CD6-40A5-AB3C-68EB2F1E4D0A}"/>
+    </a:ext>
+  </a:extLst>
+</a:theme>
 </file>
</xml_diff>